<commit_message>
refactor test of textframe
</commit_message>
<xml_diff>
--- a/ShapeCrawler.Tests/Resource/autoshape/autoshape-case004_subtitle.pptx
+++ b/ShapeCrawler.Tests/Resource/autoshape/autoshape-case004_subtitle.pptx
@@ -104,12 +104,17 @@
       </a:defRPr>
     </a:lvl9pPr>
   </p:defaultTextStyle>
+  <p:extLst>
+    <p:ext uri="{EFAFB233-063F-42B5-8137-9DF3F51BA10A}">
+      <p15:sldGuideLst xmlns:p15="http://schemas.microsoft.com/office/powerpoint/2012/main"/>
+    </p:ext>
+  </p:extLst>
 </p:presentation>
 </file>
 
 <file path=ppt/slideLayouts/slideLayout1.xml><?xml version="1.0" encoding="utf-8"?>
-<p:sldLayout xmlns:a="http://schemas.openxmlformats.org/drawingml/2006/main" xmlns:r="http://schemas.openxmlformats.org/officeDocument/2006/relationships" xmlns:p="http://schemas.openxmlformats.org/presentationml/2006/main" type="title" preserve="1">
-  <p:cSld name="Title Slide">
+<p:sldLayout xmlns:a="http://schemas.openxmlformats.org/drawingml/2006/main" xmlns:r="http://schemas.openxmlformats.org/officeDocument/2006/relationships" xmlns:p="http://schemas.openxmlformats.org/presentationml/2006/main" type="blank" preserve="1">
+  <p:cSld name="Blank">
     <p:spTree>
       <p:nvGrpSpPr>
         <p:cNvPr id="1" name=""/>
@@ -126,119 +131,10 @@
       </p:grpSpPr>
       <p:sp>
         <p:nvSpPr>
-          <p:cNvPr id="2" name="Title 1">
-            <a:extLst>
-              <a:ext uri="{FF2B5EF4-FFF2-40B4-BE49-F238E27FC236}">
-                <a16:creationId xmlns:a16="http://schemas.microsoft.com/office/drawing/2014/main" id="{B6D327F2-F186-41A4-AE61-3828203BAD7D}"/>
-              </a:ext>
-            </a:extLst>
-          </p:cNvPr>
-          <p:cNvSpPr>
-            <a:spLocks noGrp="1"/>
-          </p:cNvSpPr>
-          <p:nvPr>
-            <p:ph type="ctrTitle"/>
-          </p:nvPr>
-        </p:nvSpPr>
-        <p:spPr>
-          <a:xfrm>
-            <a:off x="1524000" y="1122363"/>
-            <a:ext cx="9144000" cy="2387600"/>
-          </a:xfrm>
-        </p:spPr>
-        <p:txBody>
-          <a:bodyPr anchor="b"/>
-          <a:lstStyle>
-            <a:lvl1pPr algn="ctr">
-              <a:defRPr sz="6000"/>
-            </a:lvl1pPr>
-          </a:lstStyle>
-          <a:p>
-            <a:r>
-              <a:rPr lang="en-US"/>
-              <a:t>Click to edit Master title style</a:t>
-            </a:r>
-            <a:endParaRPr lang="de-DE"/>
-          </a:p>
-        </p:txBody>
-      </p:sp>
-      <p:sp>
-        <p:nvSpPr>
-          <p:cNvPr id="3" name="Subtitle 2">
-            <a:extLst>
-              <a:ext uri="{FF2B5EF4-FFF2-40B4-BE49-F238E27FC236}">
-                <a16:creationId xmlns:a16="http://schemas.microsoft.com/office/drawing/2014/main" id="{D99D50BC-0240-4A12-9C44-681C8BDC8C53}"/>
-              </a:ext>
-            </a:extLst>
-          </p:cNvPr>
-          <p:cNvSpPr>
-            <a:spLocks noGrp="1"/>
-          </p:cNvSpPr>
-          <p:nvPr>
-            <p:ph type="subTitle" idx="1"/>
-          </p:nvPr>
-        </p:nvSpPr>
-        <p:spPr>
-          <a:xfrm>
-            <a:off x="1524000" y="3602038"/>
-            <a:ext cx="9144000" cy="1655762"/>
-          </a:xfrm>
-        </p:spPr>
-        <p:txBody>
-          <a:bodyPr/>
-          <a:lstStyle>
-            <a:lvl1pPr marL="0" indent="0" algn="ctr">
-              <a:buNone/>
-              <a:defRPr sz="2400"/>
-            </a:lvl1pPr>
-            <a:lvl2pPr marL="457200" indent="0" algn="ctr">
-              <a:buNone/>
-              <a:defRPr sz="2000"/>
-            </a:lvl2pPr>
-            <a:lvl3pPr marL="914400" indent="0" algn="ctr">
-              <a:buNone/>
-              <a:defRPr sz="1800"/>
-            </a:lvl3pPr>
-            <a:lvl4pPr marL="1371600" indent="0" algn="ctr">
-              <a:buNone/>
-              <a:defRPr sz="1600"/>
-            </a:lvl4pPr>
-            <a:lvl5pPr marL="1828800" indent="0" algn="ctr">
-              <a:buNone/>
-              <a:defRPr sz="1600"/>
-            </a:lvl5pPr>
-            <a:lvl6pPr marL="2286000" indent="0" algn="ctr">
-              <a:buNone/>
-              <a:defRPr sz="1600"/>
-            </a:lvl6pPr>
-            <a:lvl7pPr marL="2743200" indent="0" algn="ctr">
-              <a:buNone/>
-              <a:defRPr sz="1600"/>
-            </a:lvl7pPr>
-            <a:lvl8pPr marL="3200400" indent="0" algn="ctr">
-              <a:buNone/>
-              <a:defRPr sz="1600"/>
-            </a:lvl8pPr>
-            <a:lvl9pPr marL="3657600" indent="0" algn="ctr">
-              <a:buNone/>
-              <a:defRPr sz="1600"/>
-            </a:lvl9pPr>
-          </a:lstStyle>
-          <a:p>
-            <a:r>
-              <a:rPr lang="en-US"/>
-              <a:t>Click to edit Master subtitle style</a:t>
-            </a:r>
-            <a:endParaRPr lang="de-DE"/>
-          </a:p>
-        </p:txBody>
-      </p:sp>
-      <p:sp>
-        <p:nvSpPr>
-          <p:cNvPr id="4" name="Date Placeholder 3">
-            <a:extLst>
-              <a:ext uri="{FF2B5EF4-FFF2-40B4-BE49-F238E27FC236}">
-                <a16:creationId xmlns:a16="http://schemas.microsoft.com/office/drawing/2014/main" id="{79A6CFE5-BC00-4144-B224-4F73FDD8F42A}"/>
+          <p:cNvPr id="2" name="Date Placeholder 1">
+            <a:extLst>
+              <a:ext uri="{FF2B5EF4-FFF2-40B4-BE49-F238E27FC236}">
+                <a16:creationId xmlns:a16="http://schemas.microsoft.com/office/drawing/2014/main" id="{EF8366CA-99CC-460C-985B-7324BB102A15}"/>
               </a:ext>
             </a:extLst>
           </p:cNvPr>
@@ -256,7 +152,7 @@
           <a:p>
             <a:fld id="{1F2EEAC3-0CBE-4A78-8907-82C3CA9C5E95}" type="datetimeFigureOut">
               <a:rPr lang="de-DE" smtClean="0"/>
-              <a:t>28.09.2022</a:t>
+              <a:t>06.10.2022</a:t>
             </a:fld>
             <a:endParaRPr lang="de-DE"/>
           </a:p>
@@ -264,10 +160,10 @@
       </p:sp>
       <p:sp>
         <p:nvSpPr>
-          <p:cNvPr id="5" name="Footer Placeholder 4">
-            <a:extLst>
-              <a:ext uri="{FF2B5EF4-FFF2-40B4-BE49-F238E27FC236}">
-                <a16:creationId xmlns:a16="http://schemas.microsoft.com/office/drawing/2014/main" id="{80E37D29-6520-4D30-98EB-2B9DE46CCFCA}"/>
+          <p:cNvPr id="3" name="Footer Placeholder 2">
+            <a:extLst>
+              <a:ext uri="{FF2B5EF4-FFF2-40B4-BE49-F238E27FC236}">
+                <a16:creationId xmlns:a16="http://schemas.microsoft.com/office/drawing/2014/main" id="{141DD08C-E027-4999-8F1C-D8AFD4A6E8CB}"/>
               </a:ext>
             </a:extLst>
           </p:cNvPr>
@@ -289,10 +185,10 @@
       </p:sp>
       <p:sp>
         <p:nvSpPr>
-          <p:cNvPr id="6" name="Slide Number Placeholder 5">
-            <a:extLst>
-              <a:ext uri="{FF2B5EF4-FFF2-40B4-BE49-F238E27FC236}">
-                <a16:creationId xmlns:a16="http://schemas.microsoft.com/office/drawing/2014/main" id="{877E61FE-F0A1-4BAB-8698-FA3700ACC981}"/>
+          <p:cNvPr id="4" name="Slide Number Placeholder 3">
+            <a:extLst>
+              <a:ext uri="{FF2B5EF4-FFF2-40B4-BE49-F238E27FC236}">
+                <a16:creationId xmlns:a16="http://schemas.microsoft.com/office/drawing/2014/main" id="{06C82548-F033-4F49-9E55-7CB19F8DA7BC}"/>
               </a:ext>
             </a:extLst>
           </p:cNvPr>
@@ -316,10 +212,130 @@
           </a:p>
         </p:txBody>
       </p:sp>
+      <p:grpSp>
+        <p:nvGrpSpPr>
+          <p:cNvPr id="7" name="Group 1">
+            <a:extLst>
+              <a:ext uri="{FF2B5EF4-FFF2-40B4-BE49-F238E27FC236}">
+                <a16:creationId xmlns:a16="http://schemas.microsoft.com/office/drawing/2014/main" id="{C7395983-E815-47C6-AD4B-1D9743333543}"/>
+              </a:ext>
+            </a:extLst>
+          </p:cNvPr>
+          <p:cNvGrpSpPr/>
+          <p:nvPr userDrawn="1"/>
+        </p:nvGrpSpPr>
+        <p:grpSpPr>
+          <a:xfrm>
+            <a:off x="1169042" y="856527"/>
+            <a:ext cx="1169044" cy="1107311"/>
+            <a:chOff x="1169042" y="856527"/>
+            <a:chExt cx="1169044" cy="1107311"/>
+          </a:xfrm>
+        </p:grpSpPr>
+        <p:sp>
+          <p:nvSpPr>
+            <p:cNvPr id="6" name="AutoShape 2">
+              <a:extLst>
+                <a:ext uri="{FF2B5EF4-FFF2-40B4-BE49-F238E27FC236}">
+                  <a16:creationId xmlns:a16="http://schemas.microsoft.com/office/drawing/2014/main" id="{A84960D9-A8BC-40E2-B0B1-8BAAE93BDFE2}"/>
+                </a:ext>
+              </a:extLst>
+            </p:cNvPr>
+            <p:cNvSpPr/>
+            <p:nvPr userDrawn="1"/>
+          </p:nvSpPr>
+          <p:spPr>
+            <a:xfrm>
+              <a:off x="1169042" y="1481560"/>
+              <a:ext cx="1169043" cy="482278"/>
+            </a:xfrm>
+            <a:prstGeom prst="rect">
+              <a:avLst/>
+            </a:prstGeom>
+          </p:spPr>
+          <p:style>
+            <a:lnRef idx="2">
+              <a:schemeClr val="accent1">
+                <a:shade val="50000"/>
+              </a:schemeClr>
+            </a:lnRef>
+            <a:fillRef idx="1">
+              <a:schemeClr val="accent1"/>
+            </a:fillRef>
+            <a:effectRef idx="0">
+              <a:schemeClr val="accent1"/>
+            </a:effectRef>
+            <a:fontRef idx="minor">
+              <a:schemeClr val="lt1"/>
+            </a:fontRef>
+          </p:style>
+          <p:txBody>
+            <a:bodyPr rtlCol="0" anchor="ctr"/>
+            <a:lstStyle/>
+            <a:p>
+              <a:pPr algn="ctr"/>
+              <a:r>
+                <a:rPr lang="en-US" sz="1400" dirty="0"/>
+                <a:t>AutoShape 2</a:t>
+              </a:r>
+              <a:endParaRPr lang="de-DE" sz="1400" dirty="0"/>
+            </a:p>
+          </p:txBody>
+        </p:sp>
+        <p:sp>
+          <p:nvSpPr>
+            <p:cNvPr id="5" name="AutoShape 1">
+              <a:extLst>
+                <a:ext uri="{FF2B5EF4-FFF2-40B4-BE49-F238E27FC236}">
+                  <a16:creationId xmlns:a16="http://schemas.microsoft.com/office/drawing/2014/main" id="{72083C09-F964-490B-B88F-3F208EAB7BDE}"/>
+                </a:ext>
+              </a:extLst>
+            </p:cNvPr>
+            <p:cNvSpPr/>
+            <p:nvPr userDrawn="1"/>
+          </p:nvSpPr>
+          <p:spPr>
+            <a:xfrm>
+              <a:off x="1169043" y="856527"/>
+              <a:ext cx="1169043" cy="482278"/>
+            </a:xfrm>
+            <a:prstGeom prst="rect">
+              <a:avLst/>
+            </a:prstGeom>
+          </p:spPr>
+          <p:style>
+            <a:lnRef idx="2">
+              <a:schemeClr val="accent1">
+                <a:shade val="50000"/>
+              </a:schemeClr>
+            </a:lnRef>
+            <a:fillRef idx="1">
+              <a:schemeClr val="accent1"/>
+            </a:fillRef>
+            <a:effectRef idx="0">
+              <a:schemeClr val="accent1"/>
+            </a:effectRef>
+            <a:fontRef idx="minor">
+              <a:schemeClr val="lt1"/>
+            </a:fontRef>
+          </p:style>
+          <p:txBody>
+            <a:bodyPr rtlCol="0" anchor="ctr"/>
+            <a:lstStyle/>
+            <a:p>
+              <a:pPr algn="ctr"/>
+              <a:r>
+                <a:rPr lang="en-US" sz="1400" dirty="0"/>
+                <a:t>AutoShape 1</a:t>
+              </a:r>
+            </a:p>
+          </p:txBody>
+        </p:sp>
+      </p:grpSp>
     </p:spTree>
     <p:extLst>
       <p:ext uri="{BB962C8B-B14F-4D97-AF65-F5344CB8AC3E}">
-        <p14:creationId xmlns:p14="http://schemas.microsoft.com/office/powerpoint/2010/main" val="4106116748"/>
+        <p14:creationId xmlns:p14="http://schemas.microsoft.com/office/powerpoint/2010/main" val="3248994678"/>
       </p:ext>
     </p:extLst>
   </p:cSld>
@@ -456,7 +472,7 @@
           <a:p>
             <a:fld id="{1F2EEAC3-0CBE-4A78-8907-82C3CA9C5E95}" type="datetimeFigureOut">
               <a:rPr lang="de-DE" smtClean="0"/>
-              <a:t>28.09.2022</a:t>
+              <a:t>06.10.2022</a:t>
             </a:fld>
             <a:endParaRPr lang="de-DE"/>
           </a:p>
@@ -666,7 +682,7 @@
           <a:p>
             <a:fld id="{1F2EEAC3-0CBE-4A78-8907-82C3CA9C5E95}" type="datetimeFigureOut">
               <a:rPr lang="de-DE" smtClean="0"/>
-              <a:t>28.09.2022</a:t>
+              <a:t>06.10.2022</a:t>
             </a:fld>
             <a:endParaRPr lang="de-DE"/>
           </a:p>
@@ -740,6 +756,228 @@
 </file>
 
 <file path=ppt/slideLayouts/slideLayout2.xml><?xml version="1.0" encoding="utf-8"?>
+<p:sldLayout xmlns:a="http://schemas.openxmlformats.org/drawingml/2006/main" xmlns:r="http://schemas.openxmlformats.org/officeDocument/2006/relationships" xmlns:p="http://schemas.openxmlformats.org/presentationml/2006/main" type="title" preserve="1">
+  <p:cSld name="Title Slide">
+    <p:spTree>
+      <p:nvGrpSpPr>
+        <p:cNvPr id="1" name=""/>
+        <p:cNvGrpSpPr/>
+        <p:nvPr/>
+      </p:nvGrpSpPr>
+      <p:grpSpPr>
+        <a:xfrm>
+          <a:off x="0" y="0"/>
+          <a:ext cx="0" cy="0"/>
+          <a:chOff x="0" y="0"/>
+          <a:chExt cx="0" cy="0"/>
+        </a:xfrm>
+      </p:grpSpPr>
+      <p:sp>
+        <p:nvSpPr>
+          <p:cNvPr id="2" name="Title 1">
+            <a:extLst>
+              <a:ext uri="{FF2B5EF4-FFF2-40B4-BE49-F238E27FC236}">
+                <a16:creationId xmlns:a16="http://schemas.microsoft.com/office/drawing/2014/main" id="{B6D327F2-F186-41A4-AE61-3828203BAD7D}"/>
+              </a:ext>
+            </a:extLst>
+          </p:cNvPr>
+          <p:cNvSpPr>
+            <a:spLocks noGrp="1"/>
+          </p:cNvSpPr>
+          <p:nvPr>
+            <p:ph type="ctrTitle"/>
+          </p:nvPr>
+        </p:nvSpPr>
+        <p:spPr>
+          <a:xfrm>
+            <a:off x="1524000" y="1122363"/>
+            <a:ext cx="9144000" cy="2387600"/>
+          </a:xfrm>
+        </p:spPr>
+        <p:txBody>
+          <a:bodyPr anchor="b"/>
+          <a:lstStyle>
+            <a:lvl1pPr algn="ctr">
+              <a:defRPr sz="6000"/>
+            </a:lvl1pPr>
+          </a:lstStyle>
+          <a:p>
+            <a:r>
+              <a:rPr lang="en-US"/>
+              <a:t>Click to edit Master title style</a:t>
+            </a:r>
+            <a:endParaRPr lang="de-DE"/>
+          </a:p>
+        </p:txBody>
+      </p:sp>
+      <p:sp>
+        <p:nvSpPr>
+          <p:cNvPr id="3" name="Subtitle 2">
+            <a:extLst>
+              <a:ext uri="{FF2B5EF4-FFF2-40B4-BE49-F238E27FC236}">
+                <a16:creationId xmlns:a16="http://schemas.microsoft.com/office/drawing/2014/main" id="{D99D50BC-0240-4A12-9C44-681C8BDC8C53}"/>
+              </a:ext>
+            </a:extLst>
+          </p:cNvPr>
+          <p:cNvSpPr>
+            <a:spLocks noGrp="1"/>
+          </p:cNvSpPr>
+          <p:nvPr>
+            <p:ph type="subTitle" idx="1"/>
+          </p:nvPr>
+        </p:nvSpPr>
+        <p:spPr>
+          <a:xfrm>
+            <a:off x="1524000" y="3602038"/>
+            <a:ext cx="9144000" cy="1655762"/>
+          </a:xfrm>
+        </p:spPr>
+        <p:txBody>
+          <a:bodyPr/>
+          <a:lstStyle>
+            <a:lvl1pPr marL="0" indent="0" algn="ctr">
+              <a:buNone/>
+              <a:defRPr sz="2400"/>
+            </a:lvl1pPr>
+            <a:lvl2pPr marL="457200" indent="0" algn="ctr">
+              <a:buNone/>
+              <a:defRPr sz="2000"/>
+            </a:lvl2pPr>
+            <a:lvl3pPr marL="914400" indent="0" algn="ctr">
+              <a:buNone/>
+              <a:defRPr sz="1800"/>
+            </a:lvl3pPr>
+            <a:lvl4pPr marL="1371600" indent="0" algn="ctr">
+              <a:buNone/>
+              <a:defRPr sz="1600"/>
+            </a:lvl4pPr>
+            <a:lvl5pPr marL="1828800" indent="0" algn="ctr">
+              <a:buNone/>
+              <a:defRPr sz="1600"/>
+            </a:lvl5pPr>
+            <a:lvl6pPr marL="2286000" indent="0" algn="ctr">
+              <a:buNone/>
+              <a:defRPr sz="1600"/>
+            </a:lvl6pPr>
+            <a:lvl7pPr marL="2743200" indent="0" algn="ctr">
+              <a:buNone/>
+              <a:defRPr sz="1600"/>
+            </a:lvl7pPr>
+            <a:lvl8pPr marL="3200400" indent="0" algn="ctr">
+              <a:buNone/>
+              <a:defRPr sz="1600"/>
+            </a:lvl8pPr>
+            <a:lvl9pPr marL="3657600" indent="0" algn="ctr">
+              <a:buNone/>
+              <a:defRPr sz="1600"/>
+            </a:lvl9pPr>
+          </a:lstStyle>
+          <a:p>
+            <a:r>
+              <a:rPr lang="en-US"/>
+              <a:t>Click to edit Master subtitle style</a:t>
+            </a:r>
+            <a:endParaRPr lang="de-DE"/>
+          </a:p>
+        </p:txBody>
+      </p:sp>
+      <p:sp>
+        <p:nvSpPr>
+          <p:cNvPr id="4" name="Date Placeholder 3">
+            <a:extLst>
+              <a:ext uri="{FF2B5EF4-FFF2-40B4-BE49-F238E27FC236}">
+                <a16:creationId xmlns:a16="http://schemas.microsoft.com/office/drawing/2014/main" id="{79A6CFE5-BC00-4144-B224-4F73FDD8F42A}"/>
+              </a:ext>
+            </a:extLst>
+          </p:cNvPr>
+          <p:cNvSpPr>
+            <a:spLocks noGrp="1"/>
+          </p:cNvSpPr>
+          <p:nvPr>
+            <p:ph type="dt" sz="half" idx="10"/>
+          </p:nvPr>
+        </p:nvSpPr>
+        <p:spPr/>
+        <p:txBody>
+          <a:bodyPr/>
+          <a:lstStyle/>
+          <a:p>
+            <a:fld id="{1F2EEAC3-0CBE-4A78-8907-82C3CA9C5E95}" type="datetimeFigureOut">
+              <a:rPr lang="de-DE" smtClean="0"/>
+              <a:t>06.10.2022</a:t>
+            </a:fld>
+            <a:endParaRPr lang="de-DE"/>
+          </a:p>
+        </p:txBody>
+      </p:sp>
+      <p:sp>
+        <p:nvSpPr>
+          <p:cNvPr id="5" name="Footer Placeholder 4">
+            <a:extLst>
+              <a:ext uri="{FF2B5EF4-FFF2-40B4-BE49-F238E27FC236}">
+                <a16:creationId xmlns:a16="http://schemas.microsoft.com/office/drawing/2014/main" id="{80E37D29-6520-4D30-98EB-2B9DE46CCFCA}"/>
+              </a:ext>
+            </a:extLst>
+          </p:cNvPr>
+          <p:cNvSpPr>
+            <a:spLocks noGrp="1"/>
+          </p:cNvSpPr>
+          <p:nvPr>
+            <p:ph type="ftr" sz="quarter" idx="11"/>
+          </p:nvPr>
+        </p:nvSpPr>
+        <p:spPr/>
+        <p:txBody>
+          <a:bodyPr/>
+          <a:lstStyle/>
+          <a:p>
+            <a:endParaRPr lang="de-DE"/>
+          </a:p>
+        </p:txBody>
+      </p:sp>
+      <p:sp>
+        <p:nvSpPr>
+          <p:cNvPr id="6" name="Slide Number Placeholder 5">
+            <a:extLst>
+              <a:ext uri="{FF2B5EF4-FFF2-40B4-BE49-F238E27FC236}">
+                <a16:creationId xmlns:a16="http://schemas.microsoft.com/office/drawing/2014/main" id="{877E61FE-F0A1-4BAB-8698-FA3700ACC981}"/>
+              </a:ext>
+            </a:extLst>
+          </p:cNvPr>
+          <p:cNvSpPr>
+            <a:spLocks noGrp="1"/>
+          </p:cNvSpPr>
+          <p:nvPr>
+            <p:ph type="sldNum" sz="quarter" idx="12"/>
+          </p:nvPr>
+        </p:nvSpPr>
+        <p:spPr/>
+        <p:txBody>
+          <a:bodyPr/>
+          <a:lstStyle/>
+          <a:p>
+            <a:fld id="{AC8B22BE-2D31-4B70-997D-2E282E6BAB54}" type="slidenum">
+              <a:rPr lang="de-DE" smtClean="0"/>
+              <a:t>‹#›</a:t>
+            </a:fld>
+            <a:endParaRPr lang="de-DE"/>
+          </a:p>
+        </p:txBody>
+      </p:sp>
+    </p:spTree>
+    <p:extLst>
+      <p:ext uri="{BB962C8B-B14F-4D97-AF65-F5344CB8AC3E}">
+        <p14:creationId xmlns:p14="http://schemas.microsoft.com/office/powerpoint/2010/main" val="4106116748"/>
+      </p:ext>
+    </p:extLst>
+  </p:cSld>
+  <p:clrMapOvr>
+    <a:masterClrMapping/>
+  </p:clrMapOvr>
+</p:sldLayout>
+</file>
+
+<file path=ppt/slideLayouts/slideLayout3.xml><?xml version="1.0" encoding="utf-8"?>
 <p:sldLayout xmlns:a="http://schemas.openxmlformats.org/drawingml/2006/main" xmlns:r="http://schemas.openxmlformats.org/officeDocument/2006/relationships" xmlns:p="http://schemas.openxmlformats.org/presentationml/2006/main" type="obj" preserve="1">
   <p:cSld name="Title and Content">
     <p:spTree>
@@ -866,7 +1104,7 @@
           <a:p>
             <a:fld id="{1F2EEAC3-0CBE-4A78-8907-82C3CA9C5E95}" type="datetimeFigureOut">
               <a:rPr lang="de-DE" smtClean="0"/>
-              <a:t>28.09.2022</a:t>
+              <a:t>06.10.2022</a:t>
             </a:fld>
             <a:endParaRPr lang="de-DE"/>
           </a:p>
@@ -939,7 +1177,7 @@
 </p:sldLayout>
 </file>
 
-<file path=ppt/slideLayouts/slideLayout3.xml><?xml version="1.0" encoding="utf-8"?>
+<file path=ppt/slideLayouts/slideLayout4.xml><?xml version="1.0" encoding="utf-8"?>
 <p:sldLayout xmlns:a="http://schemas.openxmlformats.org/drawingml/2006/main" xmlns:r="http://schemas.openxmlformats.org/officeDocument/2006/relationships" xmlns:p="http://schemas.openxmlformats.org/presentationml/2006/main" type="secHead" preserve="1">
   <p:cSld name="Section Header">
     <p:spTree>
@@ -1142,7 +1380,7 @@
           <a:p>
             <a:fld id="{1F2EEAC3-0CBE-4A78-8907-82C3CA9C5E95}" type="datetimeFigureOut">
               <a:rPr lang="de-DE" smtClean="0"/>
-              <a:t>28.09.2022</a:t>
+              <a:t>06.10.2022</a:t>
             </a:fld>
             <a:endParaRPr lang="de-DE"/>
           </a:p>
@@ -1215,7 +1453,7 @@
 </p:sldLayout>
 </file>
 
-<file path=ppt/slideLayouts/slideLayout4.xml><?xml version="1.0" encoding="utf-8"?>
+<file path=ppt/slideLayouts/slideLayout5.xml><?xml version="1.0" encoding="utf-8"?>
 <p:sldLayout xmlns:a="http://schemas.openxmlformats.org/drawingml/2006/main" xmlns:r="http://schemas.openxmlformats.org/officeDocument/2006/relationships" xmlns:p="http://schemas.openxmlformats.org/presentationml/2006/main" type="twoObj" preserve="1">
   <p:cSld name="Two Content">
     <p:spTree>
@@ -1410,7 +1648,7 @@
           <a:p>
             <a:fld id="{1F2EEAC3-0CBE-4A78-8907-82C3CA9C5E95}" type="datetimeFigureOut">
               <a:rPr lang="de-DE" smtClean="0"/>
-              <a:t>28.09.2022</a:t>
+              <a:t>06.10.2022</a:t>
             </a:fld>
             <a:endParaRPr lang="de-DE"/>
           </a:p>
@@ -1483,7 +1721,7 @@
 </p:sldLayout>
 </file>
 
-<file path=ppt/slideLayouts/slideLayout5.xml><?xml version="1.0" encoding="utf-8"?>
+<file path=ppt/slideLayouts/slideLayout6.xml><?xml version="1.0" encoding="utf-8"?>
 <p:sldLayout xmlns:a="http://schemas.openxmlformats.org/drawingml/2006/main" xmlns:r="http://schemas.openxmlformats.org/officeDocument/2006/relationships" xmlns:p="http://schemas.openxmlformats.org/presentationml/2006/main" type="twoTxTwoObj" preserve="1">
   <p:cSld name="Comparison">
     <p:spTree>
@@ -1825,7 +2063,7 @@
           <a:p>
             <a:fld id="{1F2EEAC3-0CBE-4A78-8907-82C3CA9C5E95}" type="datetimeFigureOut">
               <a:rPr lang="de-DE" smtClean="0"/>
-              <a:t>28.09.2022</a:t>
+              <a:t>06.10.2022</a:t>
             </a:fld>
             <a:endParaRPr lang="de-DE"/>
           </a:p>
@@ -1898,7 +2136,7 @@
 </p:sldLayout>
 </file>
 
-<file path=ppt/slideLayouts/slideLayout6.xml><?xml version="1.0" encoding="utf-8"?>
+<file path=ppt/slideLayouts/slideLayout7.xml><?xml version="1.0" encoding="utf-8"?>
 <p:sldLayout xmlns:a="http://schemas.openxmlformats.org/drawingml/2006/main" xmlns:r="http://schemas.openxmlformats.org/officeDocument/2006/relationships" xmlns:p="http://schemas.openxmlformats.org/presentationml/2006/main" type="titleOnly" preserve="1">
   <p:cSld name="Title Only">
     <p:spTree>
@@ -1967,7 +2205,7 @@
           <a:p>
             <a:fld id="{1F2EEAC3-0CBE-4A78-8907-82C3CA9C5E95}" type="datetimeFigureOut">
               <a:rPr lang="de-DE" smtClean="0"/>
-              <a:t>28.09.2022</a:t>
+              <a:t>06.10.2022</a:t>
             </a:fld>
             <a:endParaRPr lang="de-DE"/>
           </a:p>
@@ -2031,119 +2269,6 @@
     <p:extLst>
       <p:ext uri="{BB962C8B-B14F-4D97-AF65-F5344CB8AC3E}">
         <p14:creationId xmlns:p14="http://schemas.microsoft.com/office/powerpoint/2010/main" val="284533892"/>
-      </p:ext>
-    </p:extLst>
-  </p:cSld>
-  <p:clrMapOvr>
-    <a:masterClrMapping/>
-  </p:clrMapOvr>
-</p:sldLayout>
-</file>
-
-<file path=ppt/slideLayouts/slideLayout7.xml><?xml version="1.0" encoding="utf-8"?>
-<p:sldLayout xmlns:a="http://schemas.openxmlformats.org/drawingml/2006/main" xmlns:r="http://schemas.openxmlformats.org/officeDocument/2006/relationships" xmlns:p="http://schemas.openxmlformats.org/presentationml/2006/main" type="blank" preserve="1">
-  <p:cSld name="Blank">
-    <p:spTree>
-      <p:nvGrpSpPr>
-        <p:cNvPr id="1" name=""/>
-        <p:cNvGrpSpPr/>
-        <p:nvPr/>
-      </p:nvGrpSpPr>
-      <p:grpSpPr>
-        <a:xfrm>
-          <a:off x="0" y="0"/>
-          <a:ext cx="0" cy="0"/>
-          <a:chOff x="0" y="0"/>
-          <a:chExt cx="0" cy="0"/>
-        </a:xfrm>
-      </p:grpSpPr>
-      <p:sp>
-        <p:nvSpPr>
-          <p:cNvPr id="2" name="Date Placeholder 1">
-            <a:extLst>
-              <a:ext uri="{FF2B5EF4-FFF2-40B4-BE49-F238E27FC236}">
-                <a16:creationId xmlns:a16="http://schemas.microsoft.com/office/drawing/2014/main" id="{EF8366CA-99CC-460C-985B-7324BB102A15}"/>
-              </a:ext>
-            </a:extLst>
-          </p:cNvPr>
-          <p:cNvSpPr>
-            <a:spLocks noGrp="1"/>
-          </p:cNvSpPr>
-          <p:nvPr>
-            <p:ph type="dt" sz="half" idx="10"/>
-          </p:nvPr>
-        </p:nvSpPr>
-        <p:spPr/>
-        <p:txBody>
-          <a:bodyPr/>
-          <a:lstStyle/>
-          <a:p>
-            <a:fld id="{1F2EEAC3-0CBE-4A78-8907-82C3CA9C5E95}" type="datetimeFigureOut">
-              <a:rPr lang="de-DE" smtClean="0"/>
-              <a:t>28.09.2022</a:t>
-            </a:fld>
-            <a:endParaRPr lang="de-DE"/>
-          </a:p>
-        </p:txBody>
-      </p:sp>
-      <p:sp>
-        <p:nvSpPr>
-          <p:cNvPr id="3" name="Footer Placeholder 2">
-            <a:extLst>
-              <a:ext uri="{FF2B5EF4-FFF2-40B4-BE49-F238E27FC236}">
-                <a16:creationId xmlns:a16="http://schemas.microsoft.com/office/drawing/2014/main" id="{141DD08C-E027-4999-8F1C-D8AFD4A6E8CB}"/>
-              </a:ext>
-            </a:extLst>
-          </p:cNvPr>
-          <p:cNvSpPr>
-            <a:spLocks noGrp="1"/>
-          </p:cNvSpPr>
-          <p:nvPr>
-            <p:ph type="ftr" sz="quarter" idx="11"/>
-          </p:nvPr>
-        </p:nvSpPr>
-        <p:spPr/>
-        <p:txBody>
-          <a:bodyPr/>
-          <a:lstStyle/>
-          <a:p>
-            <a:endParaRPr lang="de-DE"/>
-          </a:p>
-        </p:txBody>
-      </p:sp>
-      <p:sp>
-        <p:nvSpPr>
-          <p:cNvPr id="4" name="Slide Number Placeholder 3">
-            <a:extLst>
-              <a:ext uri="{FF2B5EF4-FFF2-40B4-BE49-F238E27FC236}">
-                <a16:creationId xmlns:a16="http://schemas.microsoft.com/office/drawing/2014/main" id="{06C82548-F033-4F49-9E55-7CB19F8DA7BC}"/>
-              </a:ext>
-            </a:extLst>
-          </p:cNvPr>
-          <p:cNvSpPr>
-            <a:spLocks noGrp="1"/>
-          </p:cNvSpPr>
-          <p:nvPr>
-            <p:ph type="sldNum" sz="quarter" idx="12"/>
-          </p:nvPr>
-        </p:nvSpPr>
-        <p:spPr/>
-        <p:txBody>
-          <a:bodyPr/>
-          <a:lstStyle/>
-          <a:p>
-            <a:fld id="{AC8B22BE-2D31-4B70-997D-2E282E6BAB54}" type="slidenum">
-              <a:rPr lang="de-DE" smtClean="0"/>
-              <a:t>‹#›</a:t>
-            </a:fld>
-            <a:endParaRPr lang="de-DE"/>
-          </a:p>
-        </p:txBody>
-      </p:sp>
-    </p:spTree>
-    <p:extLst>
-      <p:ext uri="{BB962C8B-B14F-4D97-AF65-F5344CB8AC3E}">
-        <p14:creationId xmlns:p14="http://schemas.microsoft.com/office/powerpoint/2010/main" val="3248994678"/>
       </p:ext>
     </p:extLst>
   </p:cSld>
@@ -2393,7 +2518,7 @@
           <a:p>
             <a:fld id="{1F2EEAC3-0CBE-4A78-8907-82C3CA9C5E95}" type="datetimeFigureOut">
               <a:rPr lang="de-DE" smtClean="0"/>
-              <a:t>28.09.2022</a:t>
+              <a:t>06.10.2022</a:t>
             </a:fld>
             <a:endParaRPr lang="de-DE"/>
           </a:p>
@@ -2682,7 +2807,7 @@
           <a:p>
             <a:fld id="{1F2EEAC3-0CBE-4A78-8907-82C3CA9C5E95}" type="datetimeFigureOut">
               <a:rPr lang="de-DE" smtClean="0"/>
-              <a:t>28.09.2022</a:t>
+              <a:t>06.10.2022</a:t>
             </a:fld>
             <a:endParaRPr lang="de-DE"/>
           </a:p>
@@ -2925,7 +3050,7 @@
           <a:p>
             <a:fld id="{1F2EEAC3-0CBE-4A78-8907-82C3CA9C5E95}" type="datetimeFigureOut">
               <a:rPr lang="de-DE" smtClean="0"/>
-              <a:t>28.09.2022</a:t>
+              <a:t>06.10.2022</a:t>
             </a:fld>
             <a:endParaRPr lang="de-DE"/>
           </a:p>
@@ -3030,13 +3155,13 @@
   </p:cSld>
   <p:clrMap bg1="lt1" tx1="dk1" bg2="lt2" tx2="dk2" accent1="accent1" accent2="accent2" accent3="accent3" accent4="accent4" accent5="accent5" accent6="accent6" hlink="hlink" folHlink="folHlink"/>
   <p:sldLayoutIdLst>
-    <p:sldLayoutId id="2147483649" r:id="rId1"/>
-    <p:sldLayoutId id="2147483650" r:id="rId2"/>
-    <p:sldLayoutId id="2147483651" r:id="rId3"/>
-    <p:sldLayoutId id="2147483652" r:id="rId4"/>
-    <p:sldLayoutId id="2147483653" r:id="rId5"/>
-    <p:sldLayoutId id="2147483654" r:id="rId6"/>
-    <p:sldLayoutId id="2147483655" r:id="rId7"/>
+    <p:sldLayoutId id="2147483655" r:id="rId1"/>
+    <p:sldLayoutId id="2147483649" r:id="rId2"/>
+    <p:sldLayoutId id="2147483650" r:id="rId3"/>
+    <p:sldLayoutId id="2147483651" r:id="rId4"/>
+    <p:sldLayoutId id="2147483652" r:id="rId5"/>
+    <p:sldLayoutId id="2147483653" r:id="rId6"/>
+    <p:sldLayoutId id="2147483654" r:id="rId7"/>
     <p:sldLayoutId id="2147483656" r:id="rId8"/>
     <p:sldLayoutId id="2147483657" r:id="rId9"/>
     <p:sldLayoutId id="2147483658" r:id="rId10"/>

</xml_diff>

<commit_message>
add GetByName for collection of shapes of slide master
</commit_message>
<xml_diff>
--- a/ShapeCrawler.Tests/Resource/autoshape/autoshape-case004_subtitle.pptx
+++ b/ShapeCrawler.Tests/Resource/autoshape/autoshape-case004_subtitle.pptx
@@ -152,7 +152,7 @@
           <a:p>
             <a:fld id="{1F2EEAC3-0CBE-4A78-8907-82C3CA9C5E95}" type="datetimeFigureOut">
               <a:rPr lang="de-DE" smtClean="0"/>
-              <a:t>06.10.2022</a:t>
+              <a:t>11.10.2022</a:t>
             </a:fld>
             <a:endParaRPr lang="de-DE"/>
           </a:p>
@@ -407,7 +407,15 @@
             <p:ph type="body" orient="vert" idx="1"/>
           </p:nvPr>
         </p:nvSpPr>
-        <p:spPr/>
+        <p:spPr>
+          <a:xfrm>
+            <a:off x="838200" y="1825625"/>
+            <a:ext cx="10515600" cy="2530314"/>
+          </a:xfrm>
+          <a:prstGeom prst="rect">
+            <a:avLst/>
+          </a:prstGeom>
+        </p:spPr>
         <p:txBody>
           <a:bodyPr vert="eaVert"/>
           <a:lstStyle/>
@@ -472,7 +480,7 @@
           <a:p>
             <a:fld id="{1F2EEAC3-0CBE-4A78-8907-82C3CA9C5E95}" type="datetimeFigureOut">
               <a:rPr lang="de-DE" smtClean="0"/>
-              <a:t>06.10.2022</a:t>
+              <a:t>11.10.2022</a:t>
             </a:fld>
             <a:endParaRPr lang="de-DE"/>
           </a:p>
@@ -617,6 +625,9 @@
             <a:off x="838200" y="365125"/>
             <a:ext cx="7734300" cy="5811838"/>
           </a:xfrm>
+          <a:prstGeom prst="rect">
+            <a:avLst/>
+          </a:prstGeom>
         </p:spPr>
         <p:txBody>
           <a:bodyPr vert="eaVert"/>
@@ -682,7 +693,7 @@
           <a:p>
             <a:fld id="{1F2EEAC3-0CBE-4A78-8907-82C3CA9C5E95}" type="datetimeFigureOut">
               <a:rPr lang="de-DE" smtClean="0"/>
-              <a:t>06.10.2022</a:t>
+              <a:t>11.10.2022</a:t>
             </a:fld>
             <a:endParaRPr lang="de-DE"/>
           </a:p>
@@ -831,6 +842,9 @@
             <a:off x="1524000" y="3602038"/>
             <a:ext cx="9144000" cy="1655762"/>
           </a:xfrm>
+          <a:prstGeom prst="rect">
+            <a:avLst/>
+          </a:prstGeom>
         </p:spPr>
         <p:txBody>
           <a:bodyPr/>
@@ -904,7 +918,7 @@
           <a:p>
             <a:fld id="{1F2EEAC3-0CBE-4A78-8907-82C3CA9C5E95}" type="datetimeFigureOut">
               <a:rPr lang="de-DE" smtClean="0"/>
-              <a:t>06.10.2022</a:t>
+              <a:t>11.10.2022</a:t>
             </a:fld>
             <a:endParaRPr lang="de-DE"/>
           </a:p>
@@ -1039,7 +1053,15 @@
             <p:ph idx="1"/>
           </p:nvPr>
         </p:nvSpPr>
-        <p:spPr/>
+        <p:spPr>
+          <a:xfrm>
+            <a:off x="838200" y="1825625"/>
+            <a:ext cx="10515600" cy="2530314"/>
+          </a:xfrm>
+          <a:prstGeom prst="rect">
+            <a:avLst/>
+          </a:prstGeom>
+        </p:spPr>
         <p:txBody>
           <a:bodyPr/>
           <a:lstStyle/>
@@ -1104,7 +1126,7 @@
           <a:p>
             <a:fld id="{1F2EEAC3-0CBE-4A78-8907-82C3CA9C5E95}" type="datetimeFigureOut">
               <a:rPr lang="de-DE" smtClean="0"/>
-              <a:t>06.10.2022</a:t>
+              <a:t>11.10.2022</a:t>
             </a:fld>
             <a:endParaRPr lang="de-DE"/>
           </a:p>
@@ -1253,6 +1275,9 @@
             <a:off x="831850" y="4589463"/>
             <a:ext cx="10515600" cy="1500187"/>
           </a:xfrm>
+          <a:prstGeom prst="rect">
+            <a:avLst/>
+          </a:prstGeom>
         </p:spPr>
         <p:txBody>
           <a:bodyPr/>
@@ -1380,7 +1405,7 @@
           <a:p>
             <a:fld id="{1F2EEAC3-0CBE-4A78-8907-82C3CA9C5E95}" type="datetimeFigureOut">
               <a:rPr lang="de-DE" smtClean="0"/>
-              <a:t>06.10.2022</a:t>
+              <a:t>11.10.2022</a:t>
             </a:fld>
             <a:endParaRPr lang="de-DE"/>
           </a:p>
@@ -1520,6 +1545,9 @@
             <a:off x="838200" y="1825625"/>
             <a:ext cx="5181600" cy="4351338"/>
           </a:xfrm>
+          <a:prstGeom prst="rect">
+            <a:avLst/>
+          </a:prstGeom>
         </p:spPr>
         <p:txBody>
           <a:bodyPr/>
@@ -1583,6 +1611,9 @@
             <a:off x="6172200" y="1825625"/>
             <a:ext cx="5181600" cy="4351338"/>
           </a:xfrm>
+          <a:prstGeom prst="rect">
+            <a:avLst/>
+          </a:prstGeom>
         </p:spPr>
         <p:txBody>
           <a:bodyPr/>
@@ -1648,7 +1679,7 @@
           <a:p>
             <a:fld id="{1F2EEAC3-0CBE-4A78-8907-82C3CA9C5E95}" type="datetimeFigureOut">
               <a:rPr lang="de-DE" smtClean="0"/>
-              <a:t>06.10.2022</a:t>
+              <a:t>11.10.2022</a:t>
             </a:fld>
             <a:endParaRPr lang="de-DE"/>
           </a:p>
@@ -1793,6 +1824,9 @@
             <a:off x="839788" y="1681163"/>
             <a:ext cx="5157787" cy="823912"/>
           </a:xfrm>
+          <a:prstGeom prst="rect">
+            <a:avLst/>
+          </a:prstGeom>
         </p:spPr>
         <p:txBody>
           <a:bodyPr anchor="b"/>
@@ -1864,6 +1898,9 @@
             <a:off x="839788" y="2505075"/>
             <a:ext cx="5157787" cy="3684588"/>
           </a:xfrm>
+          <a:prstGeom prst="rect">
+            <a:avLst/>
+          </a:prstGeom>
         </p:spPr>
         <p:txBody>
           <a:bodyPr/>
@@ -1927,6 +1964,9 @@
             <a:off x="6172200" y="1681163"/>
             <a:ext cx="5183188" cy="823912"/>
           </a:xfrm>
+          <a:prstGeom prst="rect">
+            <a:avLst/>
+          </a:prstGeom>
         </p:spPr>
         <p:txBody>
           <a:bodyPr anchor="b"/>
@@ -1998,6 +2038,9 @@
             <a:off x="6172200" y="2505075"/>
             <a:ext cx="5183188" cy="3684588"/>
           </a:xfrm>
+          <a:prstGeom prst="rect">
+            <a:avLst/>
+          </a:prstGeom>
         </p:spPr>
         <p:txBody>
           <a:bodyPr/>
@@ -2063,7 +2106,7 @@
           <a:p>
             <a:fld id="{1F2EEAC3-0CBE-4A78-8907-82C3CA9C5E95}" type="datetimeFigureOut">
               <a:rPr lang="de-DE" smtClean="0"/>
-              <a:t>06.10.2022</a:t>
+              <a:t>11.10.2022</a:t>
             </a:fld>
             <a:endParaRPr lang="de-DE"/>
           </a:p>
@@ -2205,7 +2248,7 @@
           <a:p>
             <a:fld id="{1F2EEAC3-0CBE-4A78-8907-82C3CA9C5E95}" type="datetimeFigureOut">
               <a:rPr lang="de-DE" smtClean="0"/>
-              <a:t>06.10.2022</a:t>
+              <a:t>11.10.2022</a:t>
             </a:fld>
             <a:endParaRPr lang="de-DE"/>
           </a:p>
@@ -2354,6 +2397,9 @@
             <a:off x="5183188" y="987425"/>
             <a:ext cx="6172200" cy="4873625"/>
           </a:xfrm>
+          <a:prstGeom prst="rect">
+            <a:avLst/>
+          </a:prstGeom>
         </p:spPr>
         <p:txBody>
           <a:bodyPr/>
@@ -2445,6 +2491,9 @@
             <a:off x="839788" y="2057400"/>
             <a:ext cx="3932237" cy="3811588"/>
           </a:xfrm>
+          <a:prstGeom prst="rect">
+            <a:avLst/>
+          </a:prstGeom>
         </p:spPr>
         <p:txBody>
           <a:bodyPr/>
@@ -2518,7 +2567,7 @@
           <a:p>
             <a:fld id="{1F2EEAC3-0CBE-4A78-8907-82C3CA9C5E95}" type="datetimeFigureOut">
               <a:rPr lang="de-DE" smtClean="0"/>
-              <a:t>06.10.2022</a:t>
+              <a:t>11.10.2022</a:t>
             </a:fld>
             <a:endParaRPr lang="de-DE"/>
           </a:p>
@@ -2667,6 +2716,9 @@
             <a:off x="5183188" y="987425"/>
             <a:ext cx="6172200" cy="4873625"/>
           </a:xfrm>
+          <a:prstGeom prst="rect">
+            <a:avLst/>
+          </a:prstGeom>
         </p:spPr>
         <p:txBody>
           <a:bodyPr/>
@@ -2734,6 +2786,9 @@
             <a:off x="839788" y="2057400"/>
             <a:ext cx="3932237" cy="3811588"/>
           </a:xfrm>
+          <a:prstGeom prst="rect">
+            <a:avLst/>
+          </a:prstGeom>
         </p:spPr>
         <p:txBody>
           <a:bodyPr/>
@@ -2807,7 +2862,7 @@
           <a:p>
             <a:fld id="{1F2EEAC3-0CBE-4A78-8907-82C3CA9C5E95}" type="datetimeFigureOut">
               <a:rPr lang="de-DE" smtClean="0"/>
-              <a:t>06.10.2022</a:t>
+              <a:t>11.10.2022</a:t>
             </a:fld>
             <a:endParaRPr lang="de-DE"/>
           </a:p>
@@ -2943,74 +2998,6 @@
       </p:sp>
       <p:sp>
         <p:nvSpPr>
-          <p:cNvPr id="3" name="Text Placeholder 2">
-            <a:extLst>
-              <a:ext uri="{FF2B5EF4-FFF2-40B4-BE49-F238E27FC236}">
-                <a16:creationId xmlns:a16="http://schemas.microsoft.com/office/drawing/2014/main" id="{6BABD30D-F321-4705-ACB7-1947B06AB730}"/>
-              </a:ext>
-            </a:extLst>
-          </p:cNvPr>
-          <p:cNvSpPr>
-            <a:spLocks noGrp="1"/>
-          </p:cNvSpPr>
-          <p:nvPr>
-            <p:ph type="body" idx="1"/>
-          </p:nvPr>
-        </p:nvSpPr>
-        <p:spPr>
-          <a:xfrm>
-            <a:off x="838200" y="1825625"/>
-            <a:ext cx="10515600" cy="4351338"/>
-          </a:xfrm>
-          <a:prstGeom prst="rect">
-            <a:avLst/>
-          </a:prstGeom>
-        </p:spPr>
-        <p:txBody>
-          <a:bodyPr vert="horz" lIns="91440" tIns="45720" rIns="91440" bIns="45720" rtlCol="0">
-            <a:normAutofit/>
-          </a:bodyPr>
-          <a:lstStyle/>
-          <a:p>
-            <a:pPr lvl="0"/>
-            <a:r>
-              <a:rPr lang="en-US"/>
-              <a:t>Click to edit Master text styles</a:t>
-            </a:r>
-          </a:p>
-          <a:p>
-            <a:pPr lvl="1"/>
-            <a:r>
-              <a:rPr lang="en-US"/>
-              <a:t>Second level</a:t>
-            </a:r>
-          </a:p>
-          <a:p>
-            <a:pPr lvl="2"/>
-            <a:r>
-              <a:rPr lang="en-US"/>
-              <a:t>Third level</a:t>
-            </a:r>
-          </a:p>
-          <a:p>
-            <a:pPr lvl="3"/>
-            <a:r>
-              <a:rPr lang="en-US"/>
-              <a:t>Fourth level</a:t>
-            </a:r>
-          </a:p>
-          <a:p>
-            <a:pPr lvl="4"/>
-            <a:r>
-              <a:rPr lang="en-US"/>
-              <a:t>Fifth level</a:t>
-            </a:r>
-            <a:endParaRPr lang="de-DE"/>
-          </a:p>
-        </p:txBody>
-      </p:sp>
-      <p:sp>
-        <p:nvSpPr>
           <p:cNvPr id="4" name="Date Placeholder 3">
             <a:extLst>
               <a:ext uri="{FF2B5EF4-FFF2-40B4-BE49-F238E27FC236}">
@@ -3050,7 +3037,7 @@
           <a:p>
             <a:fld id="{1F2EEAC3-0CBE-4A78-8907-82C3CA9C5E95}" type="datetimeFigureOut">
               <a:rPr lang="de-DE" smtClean="0"/>
-              <a:t>06.10.2022</a:t>
+              <a:t>11.10.2022</a:t>
             </a:fld>
             <a:endParaRPr lang="de-DE"/>
           </a:p>
@@ -3146,6 +3133,127 @@
           </a:p>
         </p:txBody>
       </p:sp>
+      <p:grpSp>
+        <p:nvGrpSpPr>
+          <p:cNvPr id="9" name="Group 1">
+            <a:extLst>
+              <a:ext uri="{FF2B5EF4-FFF2-40B4-BE49-F238E27FC236}">
+                <a16:creationId xmlns:a16="http://schemas.microsoft.com/office/drawing/2014/main" id="{21047A3E-BF15-4884-B385-C9C83C3EB012}"/>
+              </a:ext>
+            </a:extLst>
+          </p:cNvPr>
+          <p:cNvGrpSpPr/>
+          <p:nvPr userDrawn="1"/>
+        </p:nvGrpSpPr>
+        <p:grpSpPr>
+          <a:xfrm>
+            <a:off x="838200" y="1925718"/>
+            <a:ext cx="1295400" cy="1226590"/>
+            <a:chOff x="838200" y="1925718"/>
+            <a:chExt cx="1295400" cy="1226590"/>
+          </a:xfrm>
+        </p:grpSpPr>
+        <p:sp>
+          <p:nvSpPr>
+            <p:cNvPr id="7" name="AutoShape 2">
+              <a:extLst>
+                <a:ext uri="{FF2B5EF4-FFF2-40B4-BE49-F238E27FC236}">
+                  <a16:creationId xmlns:a16="http://schemas.microsoft.com/office/drawing/2014/main" id="{53F289E6-856F-4415-B09A-43E02EC2F915}"/>
+                </a:ext>
+              </a:extLst>
+            </p:cNvPr>
+            <p:cNvSpPr/>
+            <p:nvPr userDrawn="1"/>
+          </p:nvSpPr>
+          <p:spPr>
+            <a:xfrm>
+              <a:off x="838200" y="1925718"/>
+              <a:ext cx="1295400" cy="544010"/>
+            </a:xfrm>
+            <a:prstGeom prst="rect">
+              <a:avLst/>
+            </a:prstGeom>
+          </p:spPr>
+          <p:style>
+            <a:lnRef idx="2">
+              <a:schemeClr val="accent1">
+                <a:shade val="50000"/>
+              </a:schemeClr>
+            </a:lnRef>
+            <a:fillRef idx="1">
+              <a:schemeClr val="accent1"/>
+            </a:fillRef>
+            <a:effectRef idx="0">
+              <a:schemeClr val="accent1"/>
+            </a:effectRef>
+            <a:fontRef idx="minor">
+              <a:schemeClr val="lt1"/>
+            </a:fontRef>
+          </p:style>
+          <p:txBody>
+            <a:bodyPr rtlCol="0" anchor="ctr"/>
+            <a:lstStyle/>
+            <a:p>
+              <a:pPr algn="ctr"/>
+              <a:r>
+                <a:rPr lang="en-US" sz="1600" dirty="0"/>
+                <a:t>AutoShape 1</a:t>
+              </a:r>
+              <a:endParaRPr lang="de-DE" sz="1600" dirty="0"/>
+            </a:p>
+          </p:txBody>
+        </p:sp>
+        <p:sp>
+          <p:nvSpPr>
+            <p:cNvPr id="8" name="AutoShape 1">
+              <a:extLst>
+                <a:ext uri="{FF2B5EF4-FFF2-40B4-BE49-F238E27FC236}">
+                  <a16:creationId xmlns:a16="http://schemas.microsoft.com/office/drawing/2014/main" id="{5F0C4D21-664C-41F6-A302-9D750AC955CA}"/>
+                </a:ext>
+              </a:extLst>
+            </p:cNvPr>
+            <p:cNvSpPr/>
+            <p:nvPr userDrawn="1"/>
+          </p:nvSpPr>
+          <p:spPr>
+            <a:xfrm>
+              <a:off x="838200" y="2608298"/>
+              <a:ext cx="1295400" cy="544010"/>
+            </a:xfrm>
+            <a:prstGeom prst="rect">
+              <a:avLst/>
+            </a:prstGeom>
+          </p:spPr>
+          <p:style>
+            <a:lnRef idx="2">
+              <a:schemeClr val="accent1">
+                <a:shade val="50000"/>
+              </a:schemeClr>
+            </a:lnRef>
+            <a:fillRef idx="1">
+              <a:schemeClr val="accent1"/>
+            </a:fillRef>
+            <a:effectRef idx="0">
+              <a:schemeClr val="accent1"/>
+            </a:effectRef>
+            <a:fontRef idx="minor">
+              <a:schemeClr val="lt1"/>
+            </a:fontRef>
+          </p:style>
+          <p:txBody>
+            <a:bodyPr rtlCol="0" anchor="ctr"/>
+            <a:lstStyle/>
+            <a:p>
+              <a:pPr algn="ctr"/>
+              <a:r>
+                <a:rPr lang="en-US" sz="1600" dirty="0"/>
+                <a:t>AutoShape 2</a:t>
+              </a:r>
+              <a:endParaRPr lang="de-DE" sz="1600" dirty="0"/>
+            </a:p>
+          </p:txBody>
+        </p:sp>
+      </p:grpSp>
     </p:spTree>
     <p:extLst>
       <p:ext uri="{BB962C8B-B14F-4D97-AF65-F5344CB8AC3E}">

</xml_diff>